<commit_message>
final slides per recording 12/15
</commit_message>
<xml_diff>
--- a/session_5_grid_refactored/slides.pptx
+++ b/session_5_grid_refactored/slides.pptx
@@ -5,10 +5,10 @@
     <p:sldMasterId id="2147484002" r:id="rId1"/>
   </p:sldMasterIdLst>
   <p:notesMasterIdLst>
-    <p:notesMasterId r:id="rId10"/>
+    <p:notesMasterId r:id="rId11"/>
   </p:notesMasterIdLst>
   <p:handoutMasterIdLst>
-    <p:handoutMasterId r:id="rId11"/>
+    <p:handoutMasterId r:id="rId12"/>
   </p:handoutMasterIdLst>
   <p:sldIdLst>
     <p:sldId id="1490" r:id="rId2"/>
@@ -16,9 +16,10 @@
     <p:sldId id="1491" r:id="rId4"/>
     <p:sldId id="1536" r:id="rId5"/>
     <p:sldId id="1528" r:id="rId6"/>
-    <p:sldId id="1535" r:id="rId7"/>
-    <p:sldId id="1534" r:id="rId8"/>
-    <p:sldId id="1532" r:id="rId9"/>
+    <p:sldId id="1537" r:id="rId7"/>
+    <p:sldId id="1535" r:id="rId8"/>
+    <p:sldId id="1534" r:id="rId9"/>
+    <p:sldId id="1532" r:id="rId10"/>
   </p:sldIdLst>
   <p:sldSz cx="9144000" cy="6858000" type="screen4x3"/>
   <p:notesSz cx="6858000" cy="9144000"/>
@@ -1999,10 +2000,9 @@
           <a:p>
             <a:pPr algn="ctr"/>
             <a:r>
-              <a:rPr lang="en-US" sz="3200" dirty="0" smtClean="0"/>
+              <a:rPr lang="en-US" sz="3200" i="1" dirty="0" smtClean="0"/>
               <a:t>refactored</a:t>
             </a:r>
-            <a:endParaRPr lang="en-US" sz="3200" dirty="0" smtClean="0"/>
           </a:p>
         </p:txBody>
       </p:sp>
@@ -2728,7 +2728,7 @@
           <a:p>
             <a:r>
               <a:rPr lang="en-US" sz="3600" b="1" dirty="0" smtClean="0"/>
-              <a:t>Refactor List</a:t>
+              <a:t>Where to Find Code</a:t>
             </a:r>
             <a:endParaRPr lang="en-US" sz="3600" b="1" dirty="0"/>
           </a:p>
@@ -2743,7 +2743,7 @@
         <p:spPr>
           <a:xfrm>
             <a:off x="508000" y="1492390"/>
-            <a:ext cx="8128000" cy="5632310"/>
+            <a:ext cx="8128000" cy="1938992"/>
           </a:xfrm>
           <a:prstGeom prst="rect">
             <a:avLst/>
@@ -2756,152 +2756,88 @@
           </a:bodyPr>
           <a:lstStyle/>
           <a:p>
-            <a:pPr marL="457200" indent="-457200">
-              <a:buFont typeface="+mj-lt"/>
-              <a:buAutoNum type="arabicPeriod"/>
-            </a:pPr>
+            <a:r>
+              <a:rPr lang="en-US" sz="2400" b="1" dirty="0" err="1"/>
+              <a:t>g</a:t>
+            </a:r>
+            <a:r>
+              <a:rPr lang="en-US" sz="2400" b="1" dirty="0" err="1" smtClean="0"/>
+              <a:t>ithub.com</a:t>
+            </a:r>
             <a:r>
               <a:rPr lang="en-US" sz="2400" b="1" dirty="0" smtClean="0"/>
-              <a:t>Define layout in App </a:t>
+              <a:t>/</a:t>
+            </a:r>
+            <a:r>
+              <a:rPr lang="en-US" sz="2400" b="1" dirty="0" err="1" smtClean="0"/>
+              <a:t>RallyApps</a:t>
+            </a:r>
+            <a:r>
+              <a:rPr lang="en-US" sz="2400" b="1" dirty="0" smtClean="0"/>
+              <a:t> – </a:t>
             </a:r>
             <a:r>
               <a:rPr lang="en-US" sz="2400" dirty="0" smtClean="0"/>
-              <a:t>– Setup the layout and components in advance instead of as-we-go.</a:t>
-            </a:r>
-            <a:endParaRPr lang="en-US" sz="2400" dirty="0" smtClean="0"/>
+              <a:t>Official Rally Apps</a:t>
+            </a:r>
           </a:p>
           <a:p>
             <a:endParaRPr lang="en-US" sz="2400" b="1" dirty="0" smtClean="0"/>
           </a:p>
           <a:p>
-            <a:pPr marL="457200" indent="-457200">
-              <a:buFont typeface="+mj-lt"/>
-              <a:buAutoNum type="arabicPeriod"/>
-            </a:pPr>
             <a:r>
               <a:rPr lang="en-US" sz="2400" b="1" dirty="0" err="1" smtClean="0"/>
-              <a:t>ExtJS</a:t>
+              <a:t>g</a:t>
+            </a:r>
+            <a:r>
+              <a:rPr lang="en-US" sz="2400" b="1" dirty="0" err="1" smtClean="0"/>
+              <a:t>ithub.com</a:t>
             </a:r>
             <a:r>
               <a:rPr lang="en-US" sz="2400" b="1" dirty="0" smtClean="0"/>
-              <a:t> queries instead of app-level components </a:t>
+              <a:t>/</a:t>
+            </a:r>
+            <a:r>
+              <a:rPr lang="en-US" sz="2400" b="1" dirty="0" err="1" smtClean="0"/>
+              <a:t>RallyCommunity</a:t>
+            </a:r>
+            <a:r>
+              <a:rPr lang="en-US" sz="2400" b="1" dirty="0" smtClean="0"/>
+              <a:t> – </a:t>
             </a:r>
             <a:r>
               <a:rPr lang="en-US" sz="2400" dirty="0" smtClean="0"/>
-              <a:t>– set </a:t>
-            </a:r>
-            <a:r>
-              <a:rPr lang="en-US" sz="2400" dirty="0" err="1" smtClean="0"/>
-              <a:t>itemId</a:t>
+              <a:t>User Contributed </a:t>
             </a:r>
             <a:r>
               <a:rPr lang="en-US" sz="2400" dirty="0" smtClean="0"/>
-              <a:t> on all components and query when needed.</a:t>
-            </a:r>
-            <a:endParaRPr lang="en-US" sz="2400" dirty="0" smtClean="0"/>
-          </a:p>
-          <a:p>
-            <a:pPr marL="457200" indent="-457200">
-              <a:buFont typeface="+mj-lt"/>
-              <a:buAutoNum type="arabicPeriod"/>
-            </a:pPr>
+              <a:t>Apps</a:t>
+            </a:r>
+          </a:p>
+          <a:p>
             <a:endParaRPr lang="en-US" sz="2400" b="1" dirty="0" smtClean="0"/>
           </a:p>
           <a:p>
-            <a:pPr marL="457200" indent="-457200">
-              <a:buFont typeface="+mj-lt"/>
-              <a:buAutoNum type="arabicPeriod"/>
-            </a:pPr>
+            <a:r>
+              <a:rPr lang="en-US" sz="2400" b="1" dirty="0" err="1" smtClean="0"/>
+              <a:t>github.com</a:t>
+            </a:r>
             <a:r>
               <a:rPr lang="en-US" sz="2400" b="1" dirty="0" smtClean="0"/>
-              <a:t>Filters </a:t>
+              <a:t>/</a:t>
+            </a:r>
+            <a:r>
+              <a:rPr lang="en-US" sz="2400" b="1" dirty="0" err="1" smtClean="0"/>
+              <a:t>RallyHackathon</a:t>
+            </a:r>
+            <a:r>
+              <a:rPr lang="en-US" sz="2400" b="1" dirty="0" smtClean="0"/>
+              <a:t> – </a:t>
             </a:r>
             <a:r>
               <a:rPr lang="en-US" sz="2400" dirty="0" smtClean="0"/>
-              <a:t>– use the Filters object to create </a:t>
-            </a:r>
-            <a:r>
-              <a:rPr lang="en-US" sz="2400" dirty="0" err="1" smtClean="0"/>
-              <a:t>AND’d</a:t>
-            </a:r>
-            <a:r>
-              <a:rPr lang="en-US" sz="2400" dirty="0" smtClean="0"/>
-              <a:t> filters instead of an Array.</a:t>
-            </a:r>
-            <a:endParaRPr lang="en-US" sz="2400" dirty="0" smtClean="0"/>
-          </a:p>
-          <a:p>
-            <a:endParaRPr lang="en-US" sz="2400" dirty="0" smtClean="0"/>
-          </a:p>
-          <a:p>
-            <a:pPr marL="457200" indent="-457200">
-              <a:buFont typeface="+mj-lt"/>
-              <a:buAutoNum type="arabicPeriod"/>
-            </a:pPr>
-            <a:r>
-              <a:rPr lang="en-US" sz="2400" b="1" dirty="0" smtClean="0"/>
-              <a:t>Event Handler function calls </a:t>
-            </a:r>
-            <a:r>
-              <a:rPr lang="en-US" sz="2400" dirty="0" smtClean="0"/>
-              <a:t>– </a:t>
-            </a:r>
-            <a:r>
-              <a:rPr lang="en-US" sz="2400" dirty="0" err="1" smtClean="0"/>
-              <a:t>Naving</a:t>
-            </a:r>
-            <a:r>
-              <a:rPr lang="en-US" sz="2400" dirty="0" smtClean="0"/>
-              <a:t> convention and assumptions about how </a:t>
-            </a:r>
-            <a:r>
-              <a:rPr lang="en-US" sz="2400" dirty="0" err="1" smtClean="0"/>
-              <a:t>javascript</a:t>
-            </a:r>
-            <a:r>
-              <a:rPr lang="en-US" sz="2400" dirty="0" smtClean="0"/>
-              <a:t> passes </a:t>
-            </a:r>
-            <a:r>
-              <a:rPr lang="en-US" sz="2400" dirty="0" err="1" smtClean="0"/>
-              <a:t>params</a:t>
-            </a:r>
-            <a:r>
-              <a:rPr lang="en-US" sz="2400" dirty="0" smtClean="0"/>
-              <a:t>. </a:t>
-            </a:r>
-            <a:endParaRPr lang="en-US" dirty="0" smtClean="0"/>
-          </a:p>
-          <a:p>
-            <a:pPr marL="457200" indent="-457200">
-              <a:buFont typeface="+mj-lt"/>
-              <a:buAutoNum type="arabicPeriod"/>
-            </a:pPr>
-            <a:endParaRPr lang="en-US" sz="2400" b="1" dirty="0" smtClean="0"/>
-          </a:p>
-          <a:p>
-            <a:pPr marL="457200" indent="-457200">
-              <a:buFont typeface="+mj-lt"/>
-              <a:buAutoNum type="arabicPeriod"/>
-            </a:pPr>
-            <a:r>
-              <a:rPr lang="en-US" sz="2400" b="1" dirty="0" smtClean="0"/>
-              <a:t>Custom </a:t>
-            </a:r>
-            <a:r>
-              <a:rPr lang="en-US" sz="2400" b="1" dirty="0"/>
-              <a:t>settings to define Grid columns </a:t>
-            </a:r>
-            <a:r>
-              <a:rPr lang="en-US" sz="2400" dirty="0"/>
-              <a:t>– Let the user choose what columns to show.</a:t>
-            </a:r>
-          </a:p>
-          <a:p>
-            <a:pPr marL="457200" indent="-457200">
-              <a:buFont typeface="+mj-lt"/>
-              <a:buAutoNum type="arabicPeriod"/>
-            </a:pPr>
+              <a:t>Experimental Apps</a:t>
+            </a:r>
             <a:endParaRPr lang="en-US" sz="2400" dirty="0" smtClean="0"/>
           </a:p>
         </p:txBody>
@@ -2959,6 +2895,280 @@
         </p:nvSpPr>
         <p:spPr>
           <a:xfrm>
+            <a:off x="558800" y="469900"/>
+            <a:ext cx="7340600" cy="646331"/>
+          </a:xfrm>
+          <a:prstGeom prst="rect">
+            <a:avLst/>
+          </a:prstGeom>
+          <a:noFill/>
+        </p:spPr>
+        <p:txBody>
+          <a:bodyPr wrap="square" rtlCol="0">
+            <a:spAutoFit/>
+          </a:bodyPr>
+          <a:lstStyle/>
+          <a:p>
+            <a:r>
+              <a:rPr lang="en-US" sz="3600" b="1" dirty="0" smtClean="0"/>
+              <a:t>Refactor List</a:t>
+            </a:r>
+            <a:endParaRPr lang="en-US" sz="3600" b="1" dirty="0"/>
+          </a:p>
+        </p:txBody>
+      </p:sp>
+      <p:sp>
+        <p:nvSpPr>
+          <p:cNvPr id="6" name="TextBox 5"/>
+          <p:cNvSpPr txBox="1"/>
+          <p:nvPr/>
+        </p:nvSpPr>
+        <p:spPr>
+          <a:xfrm>
+            <a:off x="508000" y="1492390"/>
+            <a:ext cx="8128000" cy="5262979"/>
+          </a:xfrm>
+          <a:prstGeom prst="rect">
+            <a:avLst/>
+          </a:prstGeom>
+          <a:noFill/>
+        </p:spPr>
+        <p:txBody>
+          <a:bodyPr wrap="square" rtlCol="0">
+            <a:spAutoFit/>
+          </a:bodyPr>
+          <a:lstStyle/>
+          <a:p>
+            <a:pPr marL="457200" indent="-457200">
+              <a:buFont typeface="+mj-lt"/>
+              <a:buAutoNum type="arabicPeriod"/>
+            </a:pPr>
+            <a:r>
+              <a:rPr lang="en-US" sz="2400" b="1" dirty="0" smtClean="0"/>
+              <a:t>Query </a:t>
+            </a:r>
+            <a:r>
+              <a:rPr lang="en-US" sz="2400" b="1" dirty="0"/>
+              <a:t>Filters </a:t>
+            </a:r>
+            <a:r>
+              <a:rPr lang="en-US" sz="2400" dirty="0"/>
+              <a:t>– use the Filters object to create </a:t>
+            </a:r>
+            <a:r>
+              <a:rPr lang="en-US" sz="2400" dirty="0" err="1"/>
+              <a:t>AND’d</a:t>
+            </a:r>
+            <a:r>
+              <a:rPr lang="en-US" sz="2400" dirty="0"/>
+              <a:t> filters instead of an Array.</a:t>
+            </a:r>
+          </a:p>
+          <a:p>
+            <a:pPr marL="457200" indent="-457200">
+              <a:buFont typeface="+mj-lt"/>
+              <a:buAutoNum type="arabicPeriod"/>
+            </a:pPr>
+            <a:endParaRPr lang="en-US" sz="2400" b="1" dirty="0" smtClean="0"/>
+          </a:p>
+          <a:p>
+            <a:pPr marL="457200" indent="-457200">
+              <a:buFont typeface="+mj-lt"/>
+              <a:buAutoNum type="arabicPeriod"/>
+            </a:pPr>
+            <a:r>
+              <a:rPr lang="en-US" sz="2400" b="1" dirty="0" smtClean="0"/>
+              <a:t>Ext Id’s </a:t>
+            </a:r>
+            <a:r>
+              <a:rPr lang="en-US" sz="2400" b="1" dirty="0" smtClean="0"/>
+              <a:t>vs. ‘</a:t>
+            </a:r>
+            <a:r>
+              <a:rPr lang="en-US" sz="2400" b="1" dirty="0" smtClean="0"/>
+              <a:t>app</a:t>
+            </a:r>
+            <a:r>
+              <a:rPr lang="en-US" sz="2400" b="1" dirty="0" smtClean="0"/>
+              <a:t>-</a:t>
+            </a:r>
+            <a:r>
+              <a:rPr lang="en-US" sz="2400" b="1" dirty="0" smtClean="0"/>
+              <a:t>level’ </a:t>
+            </a:r>
+            <a:r>
+              <a:rPr lang="en-US" sz="2400" b="1" dirty="0" smtClean="0"/>
+              <a:t>components </a:t>
+            </a:r>
+            <a:r>
+              <a:rPr lang="en-US" sz="2400" dirty="0" smtClean="0"/>
+              <a:t>– set </a:t>
+            </a:r>
+            <a:r>
+              <a:rPr lang="en-US" sz="2400" dirty="0" err="1" smtClean="0"/>
+              <a:t>itemId</a:t>
+            </a:r>
+            <a:r>
+              <a:rPr lang="en-US" sz="2400" dirty="0" smtClean="0"/>
+              <a:t> on all components and query when needed</a:t>
+            </a:r>
+            <a:r>
+              <a:rPr lang="en-US" sz="2400" dirty="0" smtClean="0"/>
+              <a:t>.</a:t>
+            </a:r>
+          </a:p>
+          <a:p>
+            <a:pPr marL="457200" indent="-457200">
+              <a:buFont typeface="+mj-lt"/>
+              <a:buAutoNum type="arabicPeriod"/>
+            </a:pPr>
+            <a:endParaRPr lang="en-US" sz="2400" b="1" dirty="0" smtClean="0"/>
+          </a:p>
+          <a:p>
+            <a:pPr marL="457200" indent="-457200">
+              <a:buFont typeface="+mj-lt"/>
+              <a:buAutoNum type="arabicPeriod"/>
+            </a:pPr>
+            <a:r>
+              <a:rPr lang="en-US" sz="2400" b="1" dirty="0" smtClean="0"/>
+              <a:t>Define </a:t>
+            </a:r>
+            <a:r>
+              <a:rPr lang="en-US" sz="2400" b="1" dirty="0"/>
+              <a:t>layout in App </a:t>
+            </a:r>
+            <a:r>
+              <a:rPr lang="en-US" sz="2400" dirty="0"/>
+              <a:t>– Setup the layout and components in advance instead of as-we-go</a:t>
+            </a:r>
+            <a:r>
+              <a:rPr lang="en-US" sz="2400" dirty="0" smtClean="0"/>
+              <a:t>.</a:t>
+            </a:r>
+            <a:endParaRPr lang="en-US" sz="2400" dirty="0" smtClean="0"/>
+          </a:p>
+          <a:p>
+            <a:endParaRPr lang="en-US" sz="2400" dirty="0" smtClean="0"/>
+          </a:p>
+          <a:p>
+            <a:pPr marL="457200" indent="-457200">
+              <a:buFont typeface="+mj-lt"/>
+              <a:buAutoNum type="arabicPeriod"/>
+            </a:pPr>
+            <a:r>
+              <a:rPr lang="en-US" sz="2400" b="1" dirty="0" smtClean="0"/>
+              <a:t>Event Handler function calls </a:t>
+            </a:r>
+            <a:r>
+              <a:rPr lang="en-US" sz="2400" dirty="0" smtClean="0"/>
+              <a:t>– </a:t>
+            </a:r>
+            <a:r>
+              <a:rPr lang="en-US" sz="2400" dirty="0" smtClean="0"/>
+              <a:t>Naming </a:t>
+            </a:r>
+            <a:r>
+              <a:rPr lang="en-US" sz="2400" dirty="0" smtClean="0"/>
+              <a:t>convention and assumptions about how </a:t>
+            </a:r>
+            <a:r>
+              <a:rPr lang="en-US" sz="2400" dirty="0" err="1" smtClean="0"/>
+              <a:t>javascript</a:t>
+            </a:r>
+            <a:r>
+              <a:rPr lang="en-US" sz="2400" dirty="0" smtClean="0"/>
+              <a:t> passes </a:t>
+            </a:r>
+            <a:r>
+              <a:rPr lang="en-US" sz="2400" dirty="0" err="1" smtClean="0"/>
+              <a:t>params</a:t>
+            </a:r>
+            <a:r>
+              <a:rPr lang="en-US" sz="2400" dirty="0" smtClean="0"/>
+              <a:t>. </a:t>
+            </a:r>
+            <a:endParaRPr lang="en-US" sz="2400" dirty="0" smtClean="0"/>
+          </a:p>
+          <a:p>
+            <a:pPr marL="457200" indent="-457200">
+              <a:buFont typeface="+mj-lt"/>
+              <a:buAutoNum type="arabicPeriod"/>
+            </a:pPr>
+            <a:endParaRPr lang="en-US" sz="2400" b="1" dirty="0" smtClean="0"/>
+          </a:p>
+          <a:p>
+            <a:pPr marL="457200" indent="-457200">
+              <a:buFont typeface="+mj-lt"/>
+              <a:buAutoNum type="arabicPeriod"/>
+            </a:pPr>
+            <a:r>
+              <a:rPr lang="en-US" sz="2400" b="1" dirty="0" smtClean="0"/>
+              <a:t>Scope ‘me’ </a:t>
+            </a:r>
+            <a:r>
+              <a:rPr lang="en-US" sz="2400" dirty="0" smtClean="0"/>
+              <a:t>– Gain some sanity with the ‘this’ variable</a:t>
+            </a:r>
+            <a:endParaRPr lang="en-US" dirty="0" smtClean="0"/>
+          </a:p>
+          <a:p>
+            <a:endParaRPr lang="en-US" sz="2400" b="1" dirty="0" smtClean="0"/>
+          </a:p>
+        </p:txBody>
+      </p:sp>
+    </p:spTree>
+    <p:extLst>
+      <p:ext uri="{BB962C8B-B14F-4D97-AF65-F5344CB8AC3E}">
+        <p14:creationId xmlns:p14="http://schemas.microsoft.com/office/powerpoint/2010/main" val="295913670"/>
+      </p:ext>
+    </p:extLst>
+  </p:cSld>
+  <p:clrMapOvr>
+    <a:masterClrMapping/>
+  </p:clrMapOvr>
+  <mc:AlternateContent xmlns:mc="http://schemas.openxmlformats.org/markup-compatibility/2006" xmlns:p14="http://schemas.microsoft.com/office/powerpoint/2010/main">
+    <mc:Choice Requires="p14">
+      <p:transition spd="slow" p14:dur="2000"/>
+    </mc:Choice>
+    <mc:Fallback xmlns="">
+      <p:transition xmlns:p14="http://schemas.microsoft.com/office/powerpoint/2010/main" spd="slow"/>
+    </mc:Fallback>
+  </mc:AlternateContent>
+  <p:timing>
+    <p:tnLst>
+      <p:par>
+        <p:cTn xmlns:p14="http://schemas.microsoft.com/office/powerpoint/2010/main" id="1" dur="indefinite" restart="never" nodeType="tmRoot"/>
+      </p:par>
+    </p:tnLst>
+  </p:timing>
+</p:sld>
+</file>
+
+<file path=ppt/slides/slide7.xml><?xml version="1.0" encoding="utf-8"?>
+<p:sld xmlns:a="http://schemas.openxmlformats.org/drawingml/2006/main" xmlns:r="http://schemas.openxmlformats.org/officeDocument/2006/relationships" xmlns:p="http://schemas.openxmlformats.org/presentationml/2006/main">
+  <p:cSld>
+    <p:spTree>
+      <p:nvGrpSpPr>
+        <p:cNvPr id="1" name=""/>
+        <p:cNvGrpSpPr/>
+        <p:nvPr/>
+      </p:nvGrpSpPr>
+      <p:grpSpPr>
+        <a:xfrm>
+          <a:off x="0" y="0"/>
+          <a:ext cx="0" cy="0"/>
+          <a:chOff x="0" y="0"/>
+          <a:chExt cx="0" cy="0"/>
+        </a:xfrm>
+      </p:grpSpPr>
+      <p:sp>
+        <p:nvSpPr>
+          <p:cNvPr id="2" name="TextBox 1"/>
+          <p:cNvSpPr txBox="1"/>
+          <p:nvPr/>
+        </p:nvSpPr>
+        <p:spPr>
+          <a:xfrm>
             <a:off x="2844800" y="2895600"/>
             <a:ext cx="3510897" cy="707886"/>
           </a:xfrm>
@@ -3001,7 +3211,7 @@
 </p:sld>
 </file>
 
-<file path=ppt/slides/slide7.xml><?xml version="1.0" encoding="utf-8"?>
+<file path=ppt/slides/slide8.xml><?xml version="1.0" encoding="utf-8"?>
 <p:sld xmlns:a="http://schemas.openxmlformats.org/drawingml/2006/main" xmlns:r="http://schemas.openxmlformats.org/officeDocument/2006/relationships" xmlns:p="http://schemas.openxmlformats.org/presentationml/2006/main">
   <p:cSld>
     <p:spTree>
@@ -3189,7 +3399,7 @@
 </p:sld>
 </file>
 
-<file path=ppt/slides/slide8.xml><?xml version="1.0" encoding="utf-8"?>
+<file path=ppt/slides/slide9.xml><?xml version="1.0" encoding="utf-8"?>
 <p:sld xmlns:a="http://schemas.openxmlformats.org/drawingml/2006/main" xmlns:r="http://schemas.openxmlformats.org/officeDocument/2006/relationships" xmlns:p="http://schemas.openxmlformats.org/presentationml/2006/main">
   <p:cSld>
     <p:spTree>

</xml_diff>

<commit_message>
adjusted refactored list slide to show ext IDs and xtypes
</commit_message>
<xml_diff>
--- a/session_5_grid_refactored/slides.pptx
+++ b/session_5_grid_refactored/slides.pptx
@@ -15,8 +15,8 @@
     <p:sldId id="1488" r:id="rId3"/>
     <p:sldId id="1491" r:id="rId4"/>
     <p:sldId id="1536" r:id="rId5"/>
-    <p:sldId id="1528" r:id="rId6"/>
-    <p:sldId id="1537" r:id="rId7"/>
+    <p:sldId id="1537" r:id="rId6"/>
+    <p:sldId id="1528" r:id="rId7"/>
     <p:sldId id="1535" r:id="rId8"/>
     <p:sldId id="1534" r:id="rId9"/>
     <p:sldId id="1532" r:id="rId10"/>
@@ -2728,7 +2728,7 @@
           <a:p>
             <a:r>
               <a:rPr lang="en-US" sz="3600" b="1" dirty="0" smtClean="0"/>
-              <a:t>Where to Find Code</a:t>
+              <a:t>Refactor List</a:t>
             </a:r>
             <a:endParaRPr lang="en-US" sz="3600" b="1" dirty="0"/>
           </a:p>
@@ -2743,7 +2743,7 @@
         <p:spPr>
           <a:xfrm>
             <a:off x="508000" y="1492390"/>
-            <a:ext cx="8128000" cy="1938992"/>
+            <a:ext cx="8128000" cy="5262979"/>
           </a:xfrm>
           <a:prstGeom prst="rect">
             <a:avLst/>
@@ -2756,96 +2756,163 @@
           </a:bodyPr>
           <a:lstStyle/>
           <a:p>
-            <a:r>
-              <a:rPr lang="en-US" sz="2400" b="1" dirty="0" err="1"/>
-              <a:t>g</a:t>
+            <a:pPr marL="457200" indent="-457200">
+              <a:buFont typeface="+mj-lt"/>
+              <a:buAutoNum type="arabicPeriod"/>
+            </a:pPr>
+            <a:r>
+              <a:rPr lang="en-US" sz="2400" b="1" dirty="0" smtClean="0"/>
+              <a:t>Query </a:t>
+            </a:r>
+            <a:r>
+              <a:rPr lang="en-US" sz="2400" b="1" dirty="0"/>
+              <a:t>Filters </a:t>
+            </a:r>
+            <a:r>
+              <a:rPr lang="en-US" sz="2400" dirty="0"/>
+              <a:t>– use the Filters object to create </a:t>
+            </a:r>
+            <a:r>
+              <a:rPr lang="en-US" sz="2400" dirty="0" err="1"/>
+              <a:t>AND’d</a:t>
+            </a:r>
+            <a:r>
+              <a:rPr lang="en-US" sz="2400" dirty="0"/>
+              <a:t> filters instead of an Array.</a:t>
+            </a:r>
+          </a:p>
+          <a:p>
+            <a:pPr marL="457200" indent="-457200">
+              <a:buFont typeface="+mj-lt"/>
+              <a:buAutoNum type="arabicPeriod"/>
+            </a:pPr>
+            <a:endParaRPr lang="en-US" sz="2400" b="1" dirty="0" smtClean="0"/>
+          </a:p>
+          <a:p>
+            <a:pPr marL="457200" indent="-457200">
+              <a:buFont typeface="+mj-lt"/>
+              <a:buAutoNum type="arabicPeriod"/>
+            </a:pPr>
+            <a:r>
+              <a:rPr lang="en-US" sz="2400" b="1" dirty="0" smtClean="0"/>
+              <a:t>Ext IDs </a:t>
+            </a:r>
+            <a:r>
+              <a:rPr lang="en-US" sz="2400" b="1" dirty="0" smtClean="0"/>
+              <a:t>&amp; </a:t>
             </a:r>
             <a:r>
               <a:rPr lang="en-US" sz="2400" b="1" dirty="0" err="1" smtClean="0"/>
-              <a:t>ithub.com</a:t>
-            </a:r>
+              <a:t>xtypes</a:t>
+            </a:r>
+            <a:r>
+              <a:rPr lang="en-US" sz="2400" dirty="0" smtClean="0"/>
+              <a:t>– query items by id and create them with shorthand notation.</a:t>
+            </a:r>
+          </a:p>
+          <a:p>
+            <a:pPr marL="457200" indent="-457200">
+              <a:buFont typeface="+mj-lt"/>
+              <a:buAutoNum type="arabicPeriod"/>
+            </a:pPr>
+            <a:endParaRPr lang="en-US" sz="2400" b="1" dirty="0" smtClean="0"/>
+          </a:p>
+          <a:p>
+            <a:pPr marL="457200" indent="-457200">
+              <a:buFont typeface="+mj-lt"/>
+              <a:buAutoNum type="arabicPeriod"/>
+            </a:pPr>
             <a:r>
               <a:rPr lang="en-US" sz="2400" b="1" dirty="0" smtClean="0"/>
-              <a:t>/</a:t>
-            </a:r>
-            <a:r>
-              <a:rPr lang="en-US" sz="2400" b="1" dirty="0" err="1" smtClean="0"/>
-              <a:t>RallyApps</a:t>
-            </a:r>
+              <a:t>Define </a:t>
+            </a:r>
+            <a:r>
+              <a:rPr lang="en-US" sz="2400" b="1" dirty="0"/>
+              <a:t>layout in App </a:t>
+            </a:r>
+            <a:r>
+              <a:rPr lang="en-US" sz="2400" dirty="0"/>
+              <a:t>– Setup the layout and components in advance instead of as-we-go</a:t>
+            </a:r>
+            <a:r>
+              <a:rPr lang="en-US" sz="2400" dirty="0" smtClean="0"/>
+              <a:t>.</a:t>
+            </a:r>
+            <a:endParaRPr lang="en-US" sz="2400" dirty="0" smtClean="0"/>
+          </a:p>
+          <a:p>
+            <a:endParaRPr lang="en-US" sz="2400" dirty="0" smtClean="0"/>
+          </a:p>
+          <a:p>
+            <a:pPr marL="457200" indent="-457200">
+              <a:buFont typeface="+mj-lt"/>
+              <a:buAutoNum type="arabicPeriod"/>
+            </a:pPr>
             <a:r>
               <a:rPr lang="en-US" sz="2400" b="1" dirty="0" smtClean="0"/>
-              <a:t> – </a:t>
+              <a:t>Event Handler function calls </a:t>
             </a:r>
             <a:r>
               <a:rPr lang="en-US" sz="2400" dirty="0" smtClean="0"/>
-              <a:t>Official Rally Apps</a:t>
-            </a:r>
-          </a:p>
-          <a:p>
+              <a:t>– </a:t>
+            </a:r>
+            <a:r>
+              <a:rPr lang="en-US" sz="2400" dirty="0" smtClean="0"/>
+              <a:t>Naming </a:t>
+            </a:r>
+            <a:r>
+              <a:rPr lang="en-US" sz="2400" dirty="0" smtClean="0"/>
+              <a:t>convention and assumptions about how </a:t>
+            </a:r>
+            <a:r>
+              <a:rPr lang="en-US" sz="2400" dirty="0" err="1" smtClean="0"/>
+              <a:t>javascript</a:t>
+            </a:r>
+            <a:r>
+              <a:rPr lang="en-US" sz="2400" dirty="0" smtClean="0"/>
+              <a:t> passes </a:t>
+            </a:r>
+            <a:r>
+              <a:rPr lang="en-US" sz="2400" dirty="0" err="1" smtClean="0"/>
+              <a:t>params</a:t>
+            </a:r>
+            <a:r>
+              <a:rPr lang="en-US" sz="2400" dirty="0" smtClean="0"/>
+              <a:t>. </a:t>
+            </a:r>
+            <a:endParaRPr lang="en-US" sz="2400" dirty="0" smtClean="0"/>
+          </a:p>
+          <a:p>
+            <a:pPr marL="457200" indent="-457200">
+              <a:buFont typeface="+mj-lt"/>
+              <a:buAutoNum type="arabicPeriod"/>
+            </a:pPr>
             <a:endParaRPr lang="en-US" sz="2400" b="1" dirty="0" smtClean="0"/>
           </a:p>
           <a:p>
-            <a:r>
-              <a:rPr lang="en-US" sz="2400" b="1" dirty="0" err="1" smtClean="0"/>
-              <a:t>g</a:t>
-            </a:r>
-            <a:r>
-              <a:rPr lang="en-US" sz="2400" b="1" dirty="0" err="1" smtClean="0"/>
-              <a:t>ithub.com</a:t>
-            </a:r>
+            <a:pPr marL="457200" indent="-457200">
+              <a:buFont typeface="+mj-lt"/>
+              <a:buAutoNum type="arabicPeriod"/>
+            </a:pPr>
             <a:r>
               <a:rPr lang="en-US" sz="2400" b="1" dirty="0" smtClean="0"/>
-              <a:t>/</a:t>
-            </a:r>
-            <a:r>
-              <a:rPr lang="en-US" sz="2400" b="1" dirty="0" err="1" smtClean="0"/>
-              <a:t>RallyCommunity</a:t>
-            </a:r>
-            <a:r>
-              <a:rPr lang="en-US" sz="2400" b="1" dirty="0" smtClean="0"/>
-              <a:t> – </a:t>
+              <a:t>Scope ‘me’ </a:t>
             </a:r>
             <a:r>
               <a:rPr lang="en-US" sz="2400" dirty="0" smtClean="0"/>
-              <a:t>User Contributed </a:t>
-            </a:r>
-            <a:r>
-              <a:rPr lang="en-US" sz="2400" dirty="0" smtClean="0"/>
-              <a:t>Apps</a:t>
-            </a:r>
+              <a:t>– Gain some sanity with the ‘this’ variable</a:t>
+            </a:r>
+            <a:endParaRPr lang="en-US" dirty="0" smtClean="0"/>
           </a:p>
           <a:p>
             <a:endParaRPr lang="en-US" sz="2400" b="1" dirty="0" smtClean="0"/>
-          </a:p>
-          <a:p>
-            <a:r>
-              <a:rPr lang="en-US" sz="2400" b="1" dirty="0" err="1" smtClean="0"/>
-              <a:t>github.com</a:t>
-            </a:r>
-            <a:r>
-              <a:rPr lang="en-US" sz="2400" b="1" dirty="0" smtClean="0"/>
-              <a:t>/</a:t>
-            </a:r>
-            <a:r>
-              <a:rPr lang="en-US" sz="2400" b="1" dirty="0" err="1" smtClean="0"/>
-              <a:t>RallyHackathon</a:t>
-            </a:r>
-            <a:r>
-              <a:rPr lang="en-US" sz="2400" b="1" dirty="0" smtClean="0"/>
-              <a:t> – </a:t>
-            </a:r>
-            <a:r>
-              <a:rPr lang="en-US" sz="2400" dirty="0" smtClean="0"/>
-              <a:t>Experimental Apps</a:t>
-            </a:r>
-            <a:endParaRPr lang="en-US" sz="2400" dirty="0" smtClean="0"/>
           </a:p>
         </p:txBody>
       </p:sp>
     </p:spTree>
     <p:extLst>
       <p:ext uri="{BB962C8B-B14F-4D97-AF65-F5344CB8AC3E}">
-        <p14:creationId xmlns:p14="http://schemas.microsoft.com/office/powerpoint/2010/main" val="2138448820"/>
+        <p14:creationId xmlns:p14="http://schemas.microsoft.com/office/powerpoint/2010/main" val="295913670"/>
       </p:ext>
     </p:extLst>
   </p:cSld>
@@ -2911,7 +2978,7 @@
           <a:p>
             <a:r>
               <a:rPr lang="en-US" sz="3600" b="1" dirty="0" smtClean="0"/>
-              <a:t>Refactor List</a:t>
+              <a:t>Where to Find Code</a:t>
             </a:r>
             <a:endParaRPr lang="en-US" sz="3600" b="1" dirty="0"/>
           </a:p>
@@ -2926,7 +2993,7 @@
         <p:spPr>
           <a:xfrm>
             <a:off x="508000" y="1492390"/>
-            <a:ext cx="8128000" cy="5262979"/>
+            <a:ext cx="8128000" cy="1938992"/>
           </a:xfrm>
           <a:prstGeom prst="rect">
             <a:avLst/>
@@ -2939,187 +3006,96 @@
           </a:bodyPr>
           <a:lstStyle/>
           <a:p>
-            <a:pPr marL="457200" indent="-457200">
-              <a:buFont typeface="+mj-lt"/>
-              <a:buAutoNum type="arabicPeriod"/>
-            </a:pPr>
+            <a:r>
+              <a:rPr lang="en-US" sz="2400" b="1" dirty="0" err="1"/>
+              <a:t>g</a:t>
+            </a:r>
+            <a:r>
+              <a:rPr lang="en-US" sz="2400" b="1" dirty="0" err="1" smtClean="0"/>
+              <a:t>ithub.com</a:t>
+            </a:r>
             <a:r>
               <a:rPr lang="en-US" sz="2400" b="1" dirty="0" smtClean="0"/>
-              <a:t>Query </a:t>
-            </a:r>
-            <a:r>
-              <a:rPr lang="en-US" sz="2400" b="1" dirty="0"/>
-              <a:t>Filters </a:t>
-            </a:r>
-            <a:r>
-              <a:rPr lang="en-US" sz="2400" dirty="0"/>
-              <a:t>– use the Filters object to create </a:t>
-            </a:r>
-            <a:r>
-              <a:rPr lang="en-US" sz="2400" dirty="0" err="1"/>
-              <a:t>AND’d</a:t>
-            </a:r>
-            <a:r>
-              <a:rPr lang="en-US" sz="2400" dirty="0"/>
-              <a:t> filters instead of an Array.</a:t>
-            </a:r>
-          </a:p>
-          <a:p>
-            <a:pPr marL="457200" indent="-457200">
-              <a:buFont typeface="+mj-lt"/>
-              <a:buAutoNum type="arabicPeriod"/>
-            </a:pPr>
+              <a:t>/</a:t>
+            </a:r>
+            <a:r>
+              <a:rPr lang="en-US" sz="2400" b="1" dirty="0" err="1" smtClean="0"/>
+              <a:t>RallyApps</a:t>
+            </a:r>
+            <a:r>
+              <a:rPr lang="en-US" sz="2400" b="1" dirty="0" smtClean="0"/>
+              <a:t> – </a:t>
+            </a:r>
+            <a:r>
+              <a:rPr lang="en-US" sz="2400" dirty="0" smtClean="0"/>
+              <a:t>Official Rally Apps</a:t>
+            </a:r>
+          </a:p>
+          <a:p>
             <a:endParaRPr lang="en-US" sz="2400" b="1" dirty="0" smtClean="0"/>
           </a:p>
           <a:p>
-            <a:pPr marL="457200" indent="-457200">
-              <a:buFont typeface="+mj-lt"/>
-              <a:buAutoNum type="arabicPeriod"/>
-            </a:pPr>
+            <a:r>
+              <a:rPr lang="en-US" sz="2400" b="1" dirty="0" err="1" smtClean="0"/>
+              <a:t>g</a:t>
+            </a:r>
+            <a:r>
+              <a:rPr lang="en-US" sz="2400" b="1" dirty="0" err="1" smtClean="0"/>
+              <a:t>ithub.com</a:t>
+            </a:r>
             <a:r>
               <a:rPr lang="en-US" sz="2400" b="1" dirty="0" smtClean="0"/>
-              <a:t>Ext Id’s </a:t>
+              <a:t>/</a:t>
+            </a:r>
+            <a:r>
+              <a:rPr lang="en-US" sz="2400" b="1" dirty="0" err="1" smtClean="0"/>
+              <a:t>RallyCommunity</a:t>
             </a:r>
             <a:r>
               <a:rPr lang="en-US" sz="2400" b="1" dirty="0" smtClean="0"/>
-              <a:t>vs. ‘</a:t>
+              <a:t> – </a:t>
+            </a:r>
+            <a:r>
+              <a:rPr lang="en-US" sz="2400" dirty="0" smtClean="0"/>
+              <a:t>User Contributed </a:t>
+            </a:r>
+            <a:r>
+              <a:rPr lang="en-US" sz="2400" dirty="0" smtClean="0"/>
+              <a:t>Apps</a:t>
+            </a:r>
+          </a:p>
+          <a:p>
+            <a:endParaRPr lang="en-US" sz="2400" b="1" dirty="0" smtClean="0"/>
+          </a:p>
+          <a:p>
+            <a:r>
+              <a:rPr lang="en-US" sz="2400" b="1" dirty="0" err="1" smtClean="0"/>
+              <a:t>github.com</a:t>
             </a:r>
             <a:r>
               <a:rPr lang="en-US" sz="2400" b="1" dirty="0" smtClean="0"/>
-              <a:t>app</a:t>
+              <a:t>/</a:t>
+            </a:r>
+            <a:r>
+              <a:rPr lang="en-US" sz="2400" b="1" dirty="0" err="1" smtClean="0"/>
+              <a:t>RallyHackathon</a:t>
             </a:r>
             <a:r>
               <a:rPr lang="en-US" sz="2400" b="1" dirty="0" smtClean="0"/>
-              <a:t>-</a:t>
-            </a:r>
-            <a:r>
-              <a:rPr lang="en-US" sz="2400" b="1" dirty="0" smtClean="0"/>
-              <a:t>level’ </a:t>
-            </a:r>
-            <a:r>
-              <a:rPr lang="en-US" sz="2400" b="1" dirty="0" smtClean="0"/>
-              <a:t>components </a:t>
+              <a:t> – </a:t>
             </a:r>
             <a:r>
               <a:rPr lang="en-US" sz="2400" dirty="0" smtClean="0"/>
-              <a:t>– set </a:t>
-            </a:r>
-            <a:r>
-              <a:rPr lang="en-US" sz="2400" dirty="0" err="1" smtClean="0"/>
-              <a:t>itemId</a:t>
-            </a:r>
-            <a:r>
-              <a:rPr lang="en-US" sz="2400" dirty="0" smtClean="0"/>
-              <a:t> on all components and query when needed</a:t>
-            </a:r>
-            <a:r>
-              <a:rPr lang="en-US" sz="2400" dirty="0" smtClean="0"/>
-              <a:t>.</a:t>
-            </a:r>
-          </a:p>
-          <a:p>
-            <a:pPr marL="457200" indent="-457200">
-              <a:buFont typeface="+mj-lt"/>
-              <a:buAutoNum type="arabicPeriod"/>
-            </a:pPr>
-            <a:endParaRPr lang="en-US" sz="2400" b="1" dirty="0" smtClean="0"/>
-          </a:p>
-          <a:p>
-            <a:pPr marL="457200" indent="-457200">
-              <a:buFont typeface="+mj-lt"/>
-              <a:buAutoNum type="arabicPeriod"/>
-            </a:pPr>
-            <a:r>
-              <a:rPr lang="en-US" sz="2400" b="1" dirty="0" smtClean="0"/>
-              <a:t>Define </a:t>
-            </a:r>
-            <a:r>
-              <a:rPr lang="en-US" sz="2400" b="1" dirty="0"/>
-              <a:t>layout in App </a:t>
-            </a:r>
-            <a:r>
-              <a:rPr lang="en-US" sz="2400" dirty="0"/>
-              <a:t>– Setup the layout and components in advance instead of as-we-go</a:t>
-            </a:r>
-            <a:r>
-              <a:rPr lang="en-US" sz="2400" dirty="0" smtClean="0"/>
-              <a:t>.</a:t>
+              <a:t>Experimental Apps</a:t>
             </a:r>
             <a:endParaRPr lang="en-US" sz="2400" dirty="0" smtClean="0"/>
-          </a:p>
-          <a:p>
-            <a:endParaRPr lang="en-US" sz="2400" dirty="0" smtClean="0"/>
-          </a:p>
-          <a:p>
-            <a:pPr marL="457200" indent="-457200">
-              <a:buFont typeface="+mj-lt"/>
-              <a:buAutoNum type="arabicPeriod"/>
-            </a:pPr>
-            <a:r>
-              <a:rPr lang="en-US" sz="2400" b="1" dirty="0" smtClean="0"/>
-              <a:t>Event Handler function calls </a:t>
-            </a:r>
-            <a:r>
-              <a:rPr lang="en-US" sz="2400" dirty="0" smtClean="0"/>
-              <a:t>– </a:t>
-            </a:r>
-            <a:r>
-              <a:rPr lang="en-US" sz="2400" dirty="0" smtClean="0"/>
-              <a:t>Naming </a:t>
-            </a:r>
-            <a:r>
-              <a:rPr lang="en-US" sz="2400" dirty="0" smtClean="0"/>
-              <a:t>convention and assumptions about how </a:t>
-            </a:r>
-            <a:r>
-              <a:rPr lang="en-US" sz="2400" dirty="0" err="1" smtClean="0"/>
-              <a:t>javascript</a:t>
-            </a:r>
-            <a:r>
-              <a:rPr lang="en-US" sz="2400" dirty="0" smtClean="0"/>
-              <a:t> passes </a:t>
-            </a:r>
-            <a:r>
-              <a:rPr lang="en-US" sz="2400" dirty="0" err="1" smtClean="0"/>
-              <a:t>params</a:t>
-            </a:r>
-            <a:r>
-              <a:rPr lang="en-US" sz="2400" dirty="0" smtClean="0"/>
-              <a:t>. </a:t>
-            </a:r>
-            <a:endParaRPr lang="en-US" sz="2400" dirty="0" smtClean="0"/>
-          </a:p>
-          <a:p>
-            <a:pPr marL="457200" indent="-457200">
-              <a:buFont typeface="+mj-lt"/>
-              <a:buAutoNum type="arabicPeriod"/>
-            </a:pPr>
-            <a:endParaRPr lang="en-US" sz="2400" b="1" dirty="0" smtClean="0"/>
-          </a:p>
-          <a:p>
-            <a:pPr marL="457200" indent="-457200">
-              <a:buFont typeface="+mj-lt"/>
-              <a:buAutoNum type="arabicPeriod"/>
-            </a:pPr>
-            <a:r>
-              <a:rPr lang="en-US" sz="2400" b="1" dirty="0" smtClean="0"/>
-              <a:t>Scope ‘me’ </a:t>
-            </a:r>
-            <a:r>
-              <a:rPr lang="en-US" sz="2400" dirty="0" smtClean="0"/>
-              <a:t>– Gain some sanity with the ‘this’ variable</a:t>
-            </a:r>
-            <a:endParaRPr lang="en-US" dirty="0" smtClean="0"/>
-          </a:p>
-          <a:p>
-            <a:endParaRPr lang="en-US" sz="2400" b="1" dirty="0" smtClean="0"/>
           </a:p>
         </p:txBody>
       </p:sp>
     </p:spTree>
     <p:extLst>
       <p:ext uri="{BB962C8B-B14F-4D97-AF65-F5344CB8AC3E}">
-        <p14:creationId xmlns:p14="http://schemas.microsoft.com/office/powerpoint/2010/main" val="295913670"/>
+        <p14:creationId xmlns:p14="http://schemas.microsoft.com/office/powerpoint/2010/main" val="2138448820"/>
       </p:ext>
     </p:extLst>
   </p:cSld>

</xml_diff>